<commit_message>
Added some dsc config
</commit_message>
<xml_diff>
--- a/Dsc/Dsc.pptx
+++ b/Dsc/Dsc.pptx
@@ -5,10 +5,10 @@
     <p:sldMasterId id="2147483651" r:id="rId1"/>
   </p:sldMasterIdLst>
   <p:notesMasterIdLst>
-    <p:notesMasterId r:id="rId9"/>
+    <p:notesMasterId r:id="rId10"/>
   </p:notesMasterIdLst>
   <p:handoutMasterIdLst>
-    <p:handoutMasterId r:id="rId10"/>
+    <p:handoutMasterId r:id="rId11"/>
   </p:handoutMasterIdLst>
   <p:sldIdLst>
     <p:sldId id="269" r:id="rId2"/>
@@ -16,8 +16,9 @@
     <p:sldId id="265" r:id="rId4"/>
     <p:sldId id="414" r:id="rId5"/>
     <p:sldId id="456" r:id="rId6"/>
-    <p:sldId id="427" r:id="rId7"/>
-    <p:sldId id="315" r:id="rId8"/>
+    <p:sldId id="457" r:id="rId7"/>
+    <p:sldId id="427" r:id="rId8"/>
+    <p:sldId id="315" r:id="rId9"/>
   </p:sldIdLst>
   <p:sldSz cx="24382413" cy="13684250"/>
   <p:notesSz cx="6858000" cy="9144000"/>
@@ -220,7 +221,7 @@
           <a:p>
             <a:fld id="{EB7D1B3A-E4DE-0F44-B4A4-101987DE24FC}" type="datetimeFigureOut">
               <a:rPr lang="en-US" smtClean="0"/>
-              <a:t>7/17/2018</a:t>
+              <a:t>7/18/2018</a:t>
             </a:fld>
             <a:endParaRPr lang="en-US" dirty="0"/>
           </a:p>
@@ -385,7 +386,7 @@
           <a:p>
             <a:fld id="{A687CB9B-27F9-BD41-BF86-C637AA15812F}" type="datetimeFigureOut">
               <a:rPr lang="en-US" smtClean="0"/>
-              <a:t>7/17/2018</a:t>
+              <a:t>7/18/2018</a:t>
             </a:fld>
             <a:endParaRPr lang="en-US" dirty="0"/>
           </a:p>
@@ -1143,7 +1144,7 @@
             <a:effectLst/>
             <a:extLst>
               <a:ext uri="{C572A759-6A51-4108-AA02-DFA0A04FC94B}">
-                <ma14:wrappingTextBoxFlag xmlns="" xmlns:ma14="http://schemas.microsoft.com/office/mac/drawingml/2011/main" val="1"/>
+                <ma14:wrappingTextBoxFlag xmlns:ma14="http://schemas.microsoft.com/office/mac/drawingml/2011/main" xmlns="" val="1"/>
               </a:ext>
             </a:extLst>
           </p:spPr>
@@ -5345,7 +5346,7 @@
             <a:effectLst/>
             <a:extLst>
               <a:ext uri="{C572A759-6A51-4108-AA02-DFA0A04FC94B}">
-                <ma14:wrappingTextBoxFlag xmlns="" xmlns:ma14="http://schemas.microsoft.com/office/mac/drawingml/2011/main" val="1"/>
+                <ma14:wrappingTextBoxFlag xmlns:ma14="http://schemas.microsoft.com/office/mac/drawingml/2011/main" xmlns="" val="1"/>
               </a:ext>
             </a:extLst>
           </p:spPr>
@@ -5536,7 +5537,7 @@
             <a:effectLst/>
             <a:extLst>
               <a:ext uri="{C572A759-6A51-4108-AA02-DFA0A04FC94B}">
-                <ma14:wrappingTextBoxFlag xmlns="" xmlns:ma14="http://schemas.microsoft.com/office/mac/drawingml/2011/main" val="1"/>
+                <ma14:wrappingTextBoxFlag xmlns:ma14="http://schemas.microsoft.com/office/mac/drawingml/2011/main" xmlns="" val="1"/>
               </a:ext>
             </a:extLst>
           </p:spPr>
@@ -5874,7 +5875,7 @@
             <a:effectLst/>
             <a:extLst>
               <a:ext uri="{C572A759-6A51-4108-AA02-DFA0A04FC94B}">
-                <ma14:wrappingTextBoxFlag xmlns="" xmlns:ma14="http://schemas.microsoft.com/office/mac/drawingml/2011/main" val="1"/>
+                <ma14:wrappingTextBoxFlag xmlns:ma14="http://schemas.microsoft.com/office/mac/drawingml/2011/main" xmlns="" val="1"/>
               </a:ext>
             </a:extLst>
           </p:spPr>
@@ -6167,7 +6168,7 @@
             <a:effectLst/>
             <a:extLst>
               <a:ext uri="{C572A759-6A51-4108-AA02-DFA0A04FC94B}">
-                <ma14:wrappingTextBoxFlag xmlns="" xmlns:ma14="http://schemas.microsoft.com/office/mac/drawingml/2011/main" val="1"/>
+                <ma14:wrappingTextBoxFlag xmlns:ma14="http://schemas.microsoft.com/office/mac/drawingml/2011/main" xmlns="" val="1"/>
               </a:ext>
             </a:extLst>
           </p:spPr>
@@ -6460,7 +6461,7 @@
             <a:effectLst/>
             <a:extLst>
               <a:ext uri="{C572A759-6A51-4108-AA02-DFA0A04FC94B}">
-                <ma14:wrappingTextBoxFlag xmlns="" xmlns:ma14="http://schemas.microsoft.com/office/mac/drawingml/2011/main" val="1"/>
+                <ma14:wrappingTextBoxFlag xmlns:ma14="http://schemas.microsoft.com/office/mac/drawingml/2011/main" xmlns="" val="1"/>
               </a:ext>
             </a:extLst>
           </p:spPr>
@@ -6753,7 +6754,7 @@
             <a:effectLst/>
             <a:extLst>
               <a:ext uri="{C572A759-6A51-4108-AA02-DFA0A04FC94B}">
-                <ma14:wrappingTextBoxFlag xmlns="" xmlns:ma14="http://schemas.microsoft.com/office/mac/drawingml/2011/main" val="1"/>
+                <ma14:wrappingTextBoxFlag xmlns:ma14="http://schemas.microsoft.com/office/mac/drawingml/2011/main" xmlns="" val="1"/>
               </a:ext>
             </a:extLst>
           </p:spPr>
@@ -7785,7 +7786,7 @@
             <a:effectLst/>
             <a:extLst>
               <a:ext uri="{C572A759-6A51-4108-AA02-DFA0A04FC94B}">
-                <ma14:wrappingTextBoxFlag xmlns="" xmlns:ma14="http://schemas.microsoft.com/office/mac/drawingml/2011/main" val="1"/>
+                <ma14:wrappingTextBoxFlag xmlns:ma14="http://schemas.microsoft.com/office/mac/drawingml/2011/main" xmlns="" val="1"/>
               </a:ext>
             </a:extLst>
           </p:spPr>
@@ -8428,7 +8429,7 @@
             <a:effectLst/>
             <a:extLst>
               <a:ext uri="{C572A759-6A51-4108-AA02-DFA0A04FC94B}">
-                <ma14:wrappingTextBoxFlag xmlns="" xmlns:ma14="http://schemas.microsoft.com/office/mac/drawingml/2011/main" val="1"/>
+                <ma14:wrappingTextBoxFlag xmlns:ma14="http://schemas.microsoft.com/office/mac/drawingml/2011/main" xmlns="" val="1"/>
               </a:ext>
             </a:extLst>
           </p:spPr>
@@ -9038,7 +9039,7 @@
             <a:effectLst/>
             <a:extLst>
               <a:ext uri="{C572A759-6A51-4108-AA02-DFA0A04FC94B}">
-                <ma14:wrappingTextBoxFlag xmlns="" xmlns:ma14="http://schemas.microsoft.com/office/mac/drawingml/2011/main" val="1"/>
+                <ma14:wrappingTextBoxFlag xmlns:ma14="http://schemas.microsoft.com/office/mac/drawingml/2011/main" xmlns="" val="1"/>
               </a:ext>
             </a:extLst>
           </p:spPr>
@@ -9769,7 +9770,7 @@
             <a:effectLst/>
             <a:extLst>
               <a:ext uri="{C572A759-6A51-4108-AA02-DFA0A04FC94B}">
-                <ma14:wrappingTextBoxFlag xmlns="" xmlns:ma14="http://schemas.microsoft.com/office/mac/drawingml/2011/main" val="1"/>
+                <ma14:wrappingTextBoxFlag xmlns:ma14="http://schemas.microsoft.com/office/mac/drawingml/2011/main" xmlns="" val="1"/>
               </a:ext>
             </a:extLst>
           </p:spPr>
@@ -11068,7 +11069,7 @@
             <a:effectLst/>
             <a:extLst>
               <a:ext uri="{C572A759-6A51-4108-AA02-DFA0A04FC94B}">
-                <ma14:wrappingTextBoxFlag xmlns="" xmlns:ma14="http://schemas.microsoft.com/office/mac/drawingml/2011/main" val="1"/>
+                <ma14:wrappingTextBoxFlag xmlns:ma14="http://schemas.microsoft.com/office/mac/drawingml/2011/main" xmlns="" val="1"/>
               </a:ext>
             </a:extLst>
           </p:spPr>
@@ -11991,7 +11992,7 @@
             <a:effectLst/>
             <a:extLst>
               <a:ext uri="{C572A759-6A51-4108-AA02-DFA0A04FC94B}">
-                <ma14:wrappingTextBoxFlag xmlns="" xmlns:ma14="http://schemas.microsoft.com/office/mac/drawingml/2011/main" val="1"/>
+                <ma14:wrappingTextBoxFlag xmlns:ma14="http://schemas.microsoft.com/office/mac/drawingml/2011/main" xmlns="" val="1"/>
               </a:ext>
             </a:extLst>
           </p:spPr>
@@ -12686,7 +12687,7 @@
             <a:effectLst/>
             <a:extLst>
               <a:ext uri="{C572A759-6A51-4108-AA02-DFA0A04FC94B}">
-                <ma14:wrappingTextBoxFlag xmlns="" xmlns:ma14="http://schemas.microsoft.com/office/mac/drawingml/2011/main" val="1"/>
+                <ma14:wrappingTextBoxFlag xmlns:ma14="http://schemas.microsoft.com/office/mac/drawingml/2011/main" xmlns="" val="1"/>
               </a:ext>
             </a:extLst>
           </p:spPr>
@@ -15132,7 +15133,7 @@
             <a:effectLst/>
             <a:extLst>
               <a:ext uri="{C572A759-6A51-4108-AA02-DFA0A04FC94B}">
-                <ma14:wrappingTextBoxFlag xmlns="" xmlns:ma14="http://schemas.microsoft.com/office/mac/drawingml/2011/main" val="1"/>
+                <ma14:wrappingTextBoxFlag xmlns:ma14="http://schemas.microsoft.com/office/mac/drawingml/2011/main" xmlns="" val="1"/>
               </a:ext>
             </a:extLst>
           </p:spPr>
@@ -15367,7 +15368,7 @@
             <a:effectLst/>
             <a:extLst>
               <a:ext uri="{C572A759-6A51-4108-AA02-DFA0A04FC94B}">
-                <ma14:wrappingTextBoxFlag xmlns="" xmlns:ma14="http://schemas.microsoft.com/office/mac/drawingml/2011/main" val="1"/>
+                <ma14:wrappingTextBoxFlag xmlns:ma14="http://schemas.microsoft.com/office/mac/drawingml/2011/main" xmlns="" val="1"/>
               </a:ext>
             </a:extLst>
           </p:spPr>
@@ -15874,7 +15875,7 @@
             <a:effectLst/>
             <a:extLst>
               <a:ext uri="{C572A759-6A51-4108-AA02-DFA0A04FC94B}">
-                <ma14:wrappingTextBoxFlag xmlns="" xmlns:ma14="http://schemas.microsoft.com/office/mac/drawingml/2011/main" val="1"/>
+                <ma14:wrappingTextBoxFlag xmlns:ma14="http://schemas.microsoft.com/office/mac/drawingml/2011/main" xmlns="" val="1"/>
               </a:ext>
             </a:extLst>
           </p:spPr>
@@ -17253,7 +17254,7 @@
             <a:effectLst/>
             <a:extLst>
               <a:ext uri="{C572A759-6A51-4108-AA02-DFA0A04FC94B}">
-                <ma14:wrappingTextBoxFlag xmlns="" xmlns:ma14="http://schemas.microsoft.com/office/mac/drawingml/2011/main" val="1"/>
+                <ma14:wrappingTextBoxFlag xmlns:ma14="http://schemas.microsoft.com/office/mac/drawingml/2011/main" xmlns="" val="1"/>
               </a:ext>
             </a:extLst>
           </p:spPr>
@@ -17820,7 +17821,7 @@
             <a:effectLst/>
             <a:extLst>
               <a:ext uri="{C572A759-6A51-4108-AA02-DFA0A04FC94B}">
-                <ma14:wrappingTextBoxFlag xmlns="" xmlns:ma14="http://schemas.microsoft.com/office/mac/drawingml/2011/main" val="1"/>
+                <ma14:wrappingTextBoxFlag xmlns:ma14="http://schemas.microsoft.com/office/mac/drawingml/2011/main" xmlns="" val="1"/>
               </a:ext>
             </a:extLst>
           </p:spPr>
@@ -18569,7 +18570,7 @@
             <a:effectLst/>
             <a:extLst>
               <a:ext uri="{C572A759-6A51-4108-AA02-DFA0A04FC94B}">
-                <ma14:wrappingTextBoxFlag xmlns="" xmlns:ma14="http://schemas.microsoft.com/office/mac/drawingml/2011/main" val="1"/>
+                <ma14:wrappingTextBoxFlag xmlns:ma14="http://schemas.microsoft.com/office/mac/drawingml/2011/main" xmlns="" val="1"/>
               </a:ext>
             </a:extLst>
           </p:spPr>
@@ -19491,7 +19492,7 @@
             <a:effectLst/>
             <a:extLst>
               <a:ext uri="{C572A759-6A51-4108-AA02-DFA0A04FC94B}">
-                <ma14:wrappingTextBoxFlag xmlns="" xmlns:ma14="http://schemas.microsoft.com/office/mac/drawingml/2011/main" val="1"/>
+                <ma14:wrappingTextBoxFlag xmlns:ma14="http://schemas.microsoft.com/office/mac/drawingml/2011/main" xmlns="" val="1"/>
               </a:ext>
             </a:extLst>
           </p:spPr>
@@ -20220,7 +20221,7 @@
             <a:effectLst/>
             <a:extLst>
               <a:ext uri="{C572A759-6A51-4108-AA02-DFA0A04FC94B}">
-                <ma14:wrappingTextBoxFlag xmlns="" xmlns:ma14="http://schemas.microsoft.com/office/mac/drawingml/2011/main" val="1"/>
+                <ma14:wrappingTextBoxFlag xmlns:ma14="http://schemas.microsoft.com/office/mac/drawingml/2011/main" xmlns="" val="1"/>
               </a:ext>
             </a:extLst>
           </p:spPr>
@@ -20929,7 +20930,7 @@
             <a:effectLst/>
             <a:extLst>
               <a:ext uri="{C572A759-6A51-4108-AA02-DFA0A04FC94B}">
-                <ma14:wrappingTextBoxFlag xmlns="" xmlns:ma14="http://schemas.microsoft.com/office/mac/drawingml/2011/main" val="1"/>
+                <ma14:wrappingTextBoxFlag xmlns:ma14="http://schemas.microsoft.com/office/mac/drawingml/2011/main" xmlns="" val="1"/>
               </a:ext>
             </a:extLst>
           </p:spPr>
@@ -21661,7 +21662,7 @@
             <a:effectLst/>
             <a:extLst>
               <a:ext uri="{C572A759-6A51-4108-AA02-DFA0A04FC94B}">
-                <ma14:wrappingTextBoxFlag xmlns="" xmlns:ma14="http://schemas.microsoft.com/office/mac/drawingml/2011/main" val="1"/>
+                <ma14:wrappingTextBoxFlag xmlns:ma14="http://schemas.microsoft.com/office/mac/drawingml/2011/main" xmlns="" val="1"/>
               </a:ext>
             </a:extLst>
           </p:spPr>
@@ -22544,7 +22545,7 @@
             <a:effectLst/>
             <a:extLst>
               <a:ext uri="{C572A759-6A51-4108-AA02-DFA0A04FC94B}">
-                <ma14:wrappingTextBoxFlag xmlns="" xmlns:ma14="http://schemas.microsoft.com/office/mac/drawingml/2011/main" val="1"/>
+                <ma14:wrappingTextBoxFlag xmlns:ma14="http://schemas.microsoft.com/office/mac/drawingml/2011/main" xmlns="" val="1"/>
               </a:ext>
             </a:extLst>
           </p:spPr>
@@ -23799,7 +23800,7 @@
             <a:effectLst/>
             <a:extLst>
               <a:ext uri="{C572A759-6A51-4108-AA02-DFA0A04FC94B}">
-                <ma14:wrappingTextBoxFlag xmlns="" xmlns:ma14="http://schemas.microsoft.com/office/mac/drawingml/2011/main" val="1"/>
+                <ma14:wrappingTextBoxFlag xmlns:ma14="http://schemas.microsoft.com/office/mac/drawingml/2011/main" xmlns="" val="1"/>
               </a:ext>
             </a:extLst>
           </p:spPr>
@@ -25330,7 +25331,7 @@
             <a:effectLst/>
             <a:extLst>
               <a:ext uri="{C572A759-6A51-4108-AA02-DFA0A04FC94B}">
-                <ma14:wrappingTextBoxFlag xmlns="" xmlns:ma14="http://schemas.microsoft.com/office/mac/drawingml/2011/main" val="1"/>
+                <ma14:wrappingTextBoxFlag xmlns:ma14="http://schemas.microsoft.com/office/mac/drawingml/2011/main" xmlns="" val="1"/>
               </a:ext>
             </a:extLst>
           </p:spPr>
@@ -29116,7 +29117,7 @@
             <a:effectLst/>
             <a:extLst>
               <a:ext uri="{C572A759-6A51-4108-AA02-DFA0A04FC94B}">
-                <ma14:wrappingTextBoxFlag xmlns="" xmlns:ma14="http://schemas.microsoft.com/office/mac/drawingml/2011/main" val="1"/>
+                <ma14:wrappingTextBoxFlag xmlns:ma14="http://schemas.microsoft.com/office/mac/drawingml/2011/main" xmlns="" val="1"/>
               </a:ext>
             </a:extLst>
           </p:spPr>
@@ -29512,7 +29513,7 @@
             <a:effectLst/>
             <a:extLst>
               <a:ext uri="{C572A759-6A51-4108-AA02-DFA0A04FC94B}">
-                <ma14:wrappingTextBoxFlag xmlns="" xmlns:ma14="http://schemas.microsoft.com/office/mac/drawingml/2011/main" val="1"/>
+                <ma14:wrappingTextBoxFlag xmlns:ma14="http://schemas.microsoft.com/office/mac/drawingml/2011/main" xmlns="" val="1"/>
               </a:ext>
             </a:extLst>
           </p:spPr>
@@ -32791,7 +32792,7 @@
             <a:effectLst/>
             <a:extLst>
               <a:ext uri="{C572A759-6A51-4108-AA02-DFA0A04FC94B}">
-                <ma14:wrappingTextBoxFlag xmlns="" xmlns:ma14="http://schemas.microsoft.com/office/mac/drawingml/2011/main" val="1"/>
+                <ma14:wrappingTextBoxFlag xmlns:ma14="http://schemas.microsoft.com/office/mac/drawingml/2011/main" xmlns="" val="1"/>
               </a:ext>
             </a:extLst>
           </p:spPr>
@@ -34005,7 +34006,7 @@
             <a:effectLst/>
             <a:extLst>
               <a:ext uri="{C572A759-6A51-4108-AA02-DFA0A04FC94B}">
-                <ma14:wrappingTextBoxFlag xmlns="" xmlns:ma14="http://schemas.microsoft.com/office/mac/drawingml/2011/main" val="1"/>
+                <ma14:wrappingTextBoxFlag xmlns:ma14="http://schemas.microsoft.com/office/mac/drawingml/2011/main" xmlns="" val="1"/>
               </a:ext>
             </a:extLst>
           </p:spPr>
@@ -34537,7 +34538,7 @@
             <a:effectLst/>
             <a:extLst>
               <a:ext uri="{C572A759-6A51-4108-AA02-DFA0A04FC94B}">
-                <ma14:wrappingTextBoxFlag xmlns="" xmlns:ma14="http://schemas.microsoft.com/office/mac/drawingml/2011/main" val="1"/>
+                <ma14:wrappingTextBoxFlag xmlns:ma14="http://schemas.microsoft.com/office/mac/drawingml/2011/main" xmlns="" val="1"/>
               </a:ext>
             </a:extLst>
           </p:spPr>
@@ -35142,7 +35143,7 @@
             <a:effectLst/>
             <a:extLst>
               <a:ext uri="{C572A759-6A51-4108-AA02-DFA0A04FC94B}">
-                <ma14:wrappingTextBoxFlag xmlns="" xmlns:ma14="http://schemas.microsoft.com/office/mac/drawingml/2011/main" val="1"/>
+                <ma14:wrappingTextBoxFlag xmlns:ma14="http://schemas.microsoft.com/office/mac/drawingml/2011/main" xmlns="" val="1"/>
               </a:ext>
             </a:extLst>
           </p:spPr>
@@ -35393,7 +35394,7 @@
             <a:effectLst/>
             <a:extLst>
               <a:ext uri="{C572A759-6A51-4108-AA02-DFA0A04FC94B}">
-                <ma14:wrappingTextBoxFlag xmlns="" xmlns:ma14="http://schemas.microsoft.com/office/mac/drawingml/2011/main" val="1"/>
+                <ma14:wrappingTextBoxFlag xmlns:ma14="http://schemas.microsoft.com/office/mac/drawingml/2011/main" xmlns="" val="1"/>
               </a:ext>
             </a:extLst>
           </p:spPr>
@@ -38359,7 +38360,7 @@
             <a:effectLst/>
             <a:extLst>
               <a:ext uri="{C572A759-6A51-4108-AA02-DFA0A04FC94B}">
-                <ma14:wrappingTextBoxFlag xmlns="" xmlns:ma14="http://schemas.microsoft.com/office/mac/drawingml/2011/main" val="1"/>
+                <ma14:wrappingTextBoxFlag xmlns:ma14="http://schemas.microsoft.com/office/mac/drawingml/2011/main" xmlns="" val="1"/>
               </a:ext>
             </a:extLst>
           </p:spPr>
@@ -49732,7 +49733,7 @@
           <a:effectLst/>
           <a:extLst>
             <a:ext uri="{C572A759-6A51-4108-AA02-DFA0A04FC94B}">
-              <ma14:wrappingTextBoxFlag xmlns="" xmlns:ma14="http://schemas.microsoft.com/office/mac/drawingml/2011/main" val="1"/>
+              <ma14:wrappingTextBoxFlag xmlns:ma14="http://schemas.microsoft.com/office/mac/drawingml/2011/main" xmlns="" val="1"/>
             </a:ext>
           </a:extLst>
         </p:spPr>
@@ -49787,7 +49788,7 @@
           <a:effectLst/>
           <a:extLst>
             <a:ext uri="{C572A759-6A51-4108-AA02-DFA0A04FC94B}">
-              <ma14:wrappingTextBoxFlag xmlns="" xmlns:ma14="http://schemas.microsoft.com/office/mac/drawingml/2011/main" val="1"/>
+              <ma14:wrappingTextBoxFlag xmlns:ma14="http://schemas.microsoft.com/office/mac/drawingml/2011/main" xmlns="" val="1"/>
             </a:ext>
           </a:extLst>
         </p:spPr>
@@ -49842,7 +49843,7 @@
           <a:effectLst/>
           <a:extLst>
             <a:ext uri="{C572A759-6A51-4108-AA02-DFA0A04FC94B}">
-              <ma14:wrappingTextBoxFlag xmlns="" xmlns:ma14="http://schemas.microsoft.com/office/mac/drawingml/2011/main" val="1"/>
+              <ma14:wrappingTextBoxFlag xmlns:ma14="http://schemas.microsoft.com/office/mac/drawingml/2011/main" xmlns="" val="1"/>
             </a:ext>
           </a:extLst>
         </p:spPr>
@@ -49897,7 +49898,7 @@
           <a:effectLst/>
           <a:extLst>
             <a:ext uri="{C572A759-6A51-4108-AA02-DFA0A04FC94B}">
-              <ma14:wrappingTextBoxFlag xmlns="" xmlns:ma14="http://schemas.microsoft.com/office/mac/drawingml/2011/main" val="1"/>
+              <ma14:wrappingTextBoxFlag xmlns:ma14="http://schemas.microsoft.com/office/mac/drawingml/2011/main" xmlns="" val="1"/>
             </a:ext>
           </a:extLst>
         </p:spPr>
@@ -49952,7 +49953,7 @@
           <a:effectLst/>
           <a:extLst>
             <a:ext uri="{C572A759-6A51-4108-AA02-DFA0A04FC94B}">
-              <ma14:wrappingTextBoxFlag xmlns="" xmlns:ma14="http://schemas.microsoft.com/office/mac/drawingml/2011/main" val="1"/>
+              <ma14:wrappingTextBoxFlag xmlns:ma14="http://schemas.microsoft.com/office/mac/drawingml/2011/main" xmlns="" val="1"/>
             </a:ext>
           </a:extLst>
         </p:spPr>
@@ -50007,7 +50008,7 @@
           <a:effectLst/>
           <a:extLst>
             <a:ext uri="{C572A759-6A51-4108-AA02-DFA0A04FC94B}">
-              <ma14:wrappingTextBoxFlag xmlns="" xmlns:ma14="http://schemas.microsoft.com/office/mac/drawingml/2011/main" val="1"/>
+              <ma14:wrappingTextBoxFlag xmlns:ma14="http://schemas.microsoft.com/office/mac/drawingml/2011/main" xmlns="" val="1"/>
             </a:ext>
           </a:extLst>
         </p:spPr>
@@ -50076,7 +50077,7 @@
             <a:effectLst/>
             <a:extLst>
               <a:ext uri="{C572A759-6A51-4108-AA02-DFA0A04FC94B}">
-                <ma14:wrappingTextBoxFlag xmlns="" xmlns:ma14="http://schemas.microsoft.com/office/mac/drawingml/2011/main" val="1"/>
+                <ma14:wrappingTextBoxFlag xmlns:ma14="http://schemas.microsoft.com/office/mac/drawingml/2011/main" xmlns="" val="1"/>
               </a:ext>
             </a:extLst>
           </p:spPr>
@@ -50805,6 +50806,10 @@
           <a:bodyPr/>
           <a:lstStyle/>
           <a:p>
+            <a:r>
+              <a:rPr lang="pl-PL" dirty="0" smtClean="0"/>
+              <a:t>Dsc - basics</a:t>
+            </a:r>
             <a:endParaRPr lang="en-US" dirty="0"/>
           </a:p>
         </p:txBody>
@@ -50829,6 +50834,10 @@
           <a:bodyPr/>
           <a:lstStyle/>
           <a:p>
+            <a:r>
+              <a:rPr lang="pl-PL" dirty="0"/>
+              <a:t>Dsc exercises</a:t>
+            </a:r>
             <a:endParaRPr lang="en-US" dirty="0"/>
           </a:p>
         </p:txBody>
@@ -50853,6 +50862,10 @@
           <a:bodyPr/>
           <a:lstStyle/>
           <a:p>
+            <a:r>
+              <a:rPr lang="pl-PL" dirty="0" smtClean="0"/>
+              <a:t>Azure Dsc</a:t>
+            </a:r>
             <a:endParaRPr lang="en-US" dirty="0"/>
           </a:p>
         </p:txBody>
@@ -50906,8 +50919,8 @@
         </p:nvSpPr>
         <p:spPr>
           <a:xfrm>
-            <a:off x="1803009" y="1729557"/>
-            <a:ext cx="20737513" cy="1754326"/>
+            <a:off x="1803009" y="2061955"/>
+            <a:ext cx="20737513" cy="1421928"/>
           </a:xfrm>
         </p:spPr>
         <p:txBody>
@@ -50916,7 +50929,20 @@
           </a:bodyPr>
           <a:lstStyle/>
           <a:p>
-            <a:endParaRPr lang="en-US" dirty="0"/>
+            <a:pPr algn="l"/>
+            <a:r>
+              <a:rPr lang="pl-PL" sz="9600" dirty="0"/>
+              <a:t>DSC </a:t>
+            </a:r>
+            <a:r>
+              <a:rPr lang="pl-PL" sz="9600" dirty="0"/>
+              <a:t>- </a:t>
+            </a:r>
+            <a:r>
+              <a:rPr lang="pl-PL" sz="9600" dirty="0"/>
+              <a:t>basics</a:t>
+            </a:r>
+            <a:endParaRPr lang="en-US" sz="9600" dirty="0"/>
           </a:p>
         </p:txBody>
       </p:sp>
@@ -50941,6 +50967,28 @@
           <a:lstStyle/>
           <a:p>
             <a:pPr algn="l"/>
+            <a:r>
+              <a:rPr lang="en-US" dirty="0"/>
+              <a:t>DSC is a management platform in PowerShell that enables you to manage your IT and development infrastructure with configuration as code</a:t>
+            </a:r>
+            <a:r>
+              <a:rPr lang="en-US" dirty="0" smtClean="0"/>
+              <a:t>.</a:t>
+            </a:r>
+            <a:endParaRPr lang="pl-PL" dirty="0" smtClean="0"/>
+          </a:p>
+          <a:p>
+            <a:pPr algn="l"/>
+            <a:endParaRPr lang="pl-PL" dirty="0"/>
+          </a:p>
+          <a:p>
+            <a:pPr algn="l"/>
+            <a:r>
+              <a:rPr lang="pl-PL" dirty="0" smtClean="0">
+                <a:hlinkClick r:id="rId2"/>
+              </a:rPr>
+              <a:t>Link</a:t>
+            </a:r>
             <a:endParaRPr lang="pl-PL" dirty="0" smtClean="0"/>
           </a:p>
         </p:txBody>
@@ -50994,8 +51042,8 @@
         </p:nvSpPr>
         <p:spPr>
           <a:xfrm>
-            <a:off x="1803009" y="2283554"/>
-            <a:ext cx="20737513" cy="1200329"/>
+            <a:off x="1803009" y="2061955"/>
+            <a:ext cx="20737513" cy="1421928"/>
           </a:xfrm>
         </p:spPr>
         <p:txBody>
@@ -51005,6 +51053,14 @@
           <a:lstStyle/>
           <a:p>
             <a:pPr algn="l"/>
+            <a:r>
+              <a:rPr lang="pl-PL" sz="9600" dirty="0"/>
+              <a:t>Azure </a:t>
+            </a:r>
+            <a:r>
+              <a:rPr lang="pl-PL" sz="9600" dirty="0" smtClean="0"/>
+              <a:t>DSC</a:t>
+            </a:r>
             <a:endParaRPr lang="pl-PL" sz="8000" dirty="0"/>
           </a:p>
         </p:txBody>
@@ -51030,6 +51086,28 @@
           <a:lstStyle/>
           <a:p>
             <a:pPr algn="l"/>
+            <a:r>
+              <a:rPr lang="en-US" dirty="0"/>
+              <a:t>The Azure VM Agent and associated extensions are part of Microsoft Azure infrastructure services. VM extensions are software components that extend VM functionality and simplify various VM management operations</a:t>
+            </a:r>
+            <a:r>
+              <a:rPr lang="en-US" dirty="0" smtClean="0"/>
+              <a:t>.</a:t>
+            </a:r>
+            <a:endParaRPr lang="pl-PL" dirty="0" smtClean="0"/>
+          </a:p>
+          <a:p>
+            <a:pPr algn="l"/>
+            <a:endParaRPr lang="pl-PL" dirty="0"/>
+          </a:p>
+          <a:p>
+            <a:pPr algn="l"/>
+            <a:r>
+              <a:rPr lang="pl-PL" dirty="0" smtClean="0">
+                <a:hlinkClick r:id="rId2"/>
+              </a:rPr>
+              <a:t>Link</a:t>
+            </a:r>
             <a:endParaRPr lang="pl-PL" dirty="0" smtClean="0"/>
           </a:p>
         </p:txBody>
@@ -51081,6 +51159,98 @@
             <p:ph type="ctrTitle"/>
           </p:nvPr>
         </p:nvSpPr>
+        <p:spPr>
+          <a:xfrm>
+            <a:off x="1803009" y="2061955"/>
+            <a:ext cx="20737513" cy="1421928"/>
+          </a:xfrm>
+        </p:spPr>
+        <p:txBody>
+          <a:bodyPr>
+            <a:spAutoFit/>
+          </a:bodyPr>
+          <a:lstStyle/>
+          <a:p>
+            <a:pPr algn="l"/>
+            <a:r>
+              <a:rPr lang="pl-PL" sz="9600" dirty="0"/>
+              <a:t>Dsc exercises</a:t>
+            </a:r>
+          </a:p>
+        </p:txBody>
+      </p:sp>
+      <p:sp>
+        <p:nvSpPr>
+          <p:cNvPr id="3" name="Text Placeholder 2"/>
+          <p:cNvSpPr>
+            <a:spLocks noGrp="1"/>
+          </p:cNvSpPr>
+          <p:nvPr>
+            <p:ph type="body" sz="quarter" idx="18"/>
+          </p:nvPr>
+        </p:nvSpPr>
+        <p:spPr>
+          <a:xfrm>
+            <a:off x="1894062" y="3673773"/>
+            <a:ext cx="20737513" cy="9433048"/>
+          </a:xfrm>
+        </p:spPr>
+        <p:txBody>
+          <a:bodyPr/>
+          <a:lstStyle/>
+          <a:p>
+            <a:pPr algn="l"/>
+            <a:endParaRPr lang="pl-PL" dirty="0" smtClean="0"/>
+          </a:p>
+        </p:txBody>
+      </p:sp>
+    </p:spTree>
+    <p:extLst>
+      <p:ext uri="{BB962C8B-B14F-4D97-AF65-F5344CB8AC3E}">
+        <p14:creationId xmlns:p14="http://schemas.microsoft.com/office/powerpoint/2010/main" val="692783545"/>
+      </p:ext>
+    </p:extLst>
+  </p:cSld>
+  <p:clrMapOvr>
+    <a:masterClrMapping/>
+  </p:clrMapOvr>
+  <p:timing>
+    <p:tnLst>
+      <p:par>
+        <p:cTn id="1" dur="indefinite" restart="never" nodeType="tmRoot"/>
+      </p:par>
+    </p:tnLst>
+  </p:timing>
+</p:sld>
+</file>
+
+<file path=ppt/slides/slide7.xml><?xml version="1.0" encoding="utf-8"?>
+<p:sld xmlns:a="http://schemas.openxmlformats.org/drawingml/2006/main" xmlns:r="http://schemas.openxmlformats.org/officeDocument/2006/relationships" xmlns:p="http://schemas.openxmlformats.org/presentationml/2006/main">
+  <p:cSld>
+    <p:spTree>
+      <p:nvGrpSpPr>
+        <p:cNvPr id="1" name=""/>
+        <p:cNvGrpSpPr/>
+        <p:nvPr/>
+      </p:nvGrpSpPr>
+      <p:grpSpPr>
+        <a:xfrm>
+          <a:off x="0" y="0"/>
+          <a:ext cx="0" cy="0"/>
+          <a:chOff x="0" y="0"/>
+          <a:chExt cx="0" cy="0"/>
+        </a:xfrm>
+      </p:grpSpPr>
+      <p:sp>
+        <p:nvSpPr>
+          <p:cNvPr id="2" name="Title 1"/>
+          <p:cNvSpPr>
+            <a:spLocks noGrp="1"/>
+          </p:cNvSpPr>
+          <p:nvPr>
+            <p:ph type="ctrTitle"/>
+          </p:nvPr>
+        </p:nvSpPr>
         <p:spPr/>
         <p:txBody>
           <a:bodyPr/>
@@ -51156,7 +51326,7 @@
 </p:sld>
 </file>
 
-<file path=ppt/slides/slide7.xml><?xml version="1.0" encoding="utf-8"?>
+<file path=ppt/slides/slide8.xml><?xml version="1.0" encoding="utf-8"?>
 <p:sld xmlns:a="http://schemas.openxmlformats.org/drawingml/2006/main" xmlns:r="http://schemas.openxmlformats.org/officeDocument/2006/relationships" xmlns:p="http://schemas.openxmlformats.org/presentationml/2006/main">
   <p:cSld>
     <p:spTree>

</xml_diff>